<commit_message>
Hide TechBash slide for VSLive sessions
</commit_message>
<xml_diff>
--- a/2024/0430_VSLiveChicago/ContributeToMsLearn/VSLCH24_How to Become a MS Learn Contributor_AlvinAshcraft.pptx
+++ b/2024/0430_VSLiveChicago/ContributeToMsLearn/VSLCH24_How to Become a MS Learn Contributor_AlvinAshcraft.pptx
@@ -182,6 +182,14 @@
 </p:presentation>
 </file>
 
+<file path=ppt/revisionInfo.xml><?xml version="1.0" encoding="utf-8"?>
+<p1510:revInfo xmlns:a="http://schemas.openxmlformats.org/drawingml/2006/main" xmlns:r="http://schemas.openxmlformats.org/officeDocument/2006/relationships" xmlns:p1510="http://schemas.microsoft.com/office/powerpoint/2015/10/main">
+  <p1510:revLst>
+    <p1510:client id="{29144DD2-F748-891C-487B-AA76523A9850}" v="1" dt="2024-04-27T16:42:35.302"/>
+  </p1510:revLst>
+</p1510:revInfo>
+</file>
+
 <file path=ppt/handoutMasters/handoutMaster1.xml><?xml version="1.0" encoding="utf-8"?>
 <p:handoutMaster xmlns:a="http://schemas.openxmlformats.org/drawingml/2006/main" xmlns:r="http://schemas.openxmlformats.org/officeDocument/2006/relationships" xmlns:p="http://schemas.openxmlformats.org/presentationml/2006/main">
   <p:cSld>
@@ -5442,7 +5450,7 @@
           <a:p>
             <a:fld id="{D088F999-7A4E-6B4F-9FED-EF75B73AD044}" type="datetimeFigureOut">
               <a:rPr lang="en-US" smtClean="0"/>
-              <a:t>4/20/2024</a:t>
+              <a:t>4/27/2024</a:t>
             </a:fld>
             <a:endParaRPr lang="en-US"/>
           </a:p>
@@ -5610,7 +5618,7 @@
           <a:p>
             <a:fld id="{D088F999-7A4E-6B4F-9FED-EF75B73AD044}" type="datetimeFigureOut">
               <a:rPr lang="en-US" smtClean="0"/>
-              <a:t>4/20/2024</a:t>
+              <a:t>4/27/2024</a:t>
             </a:fld>
             <a:endParaRPr lang="en-US"/>
           </a:p>
@@ -5788,7 +5796,7 @@
           <a:p>
             <a:fld id="{D088F999-7A4E-6B4F-9FED-EF75B73AD044}" type="datetimeFigureOut">
               <a:rPr lang="en-US" smtClean="0"/>
-              <a:t>4/20/2024</a:t>
+              <a:t>4/27/2024</a:t>
             </a:fld>
             <a:endParaRPr lang="en-US"/>
           </a:p>
@@ -5957,7 +5965,7 @@
             <a:fld id="{3FE51E94-D08C-431E-88FC-7EB62E529A19}" type="datetimeFigureOut">
               <a:rPr lang="en-US" smtClean="0"/>
               <a:pPr/>
-              <a:t>4/20/2024</a:t>
+              <a:t>4/27/2024</a:t>
             </a:fld>
             <a:endParaRPr lang="en-US"/>
           </a:p>
@@ -6126,7 +6134,7 @@
           <a:p>
             <a:fld id="{D088F999-7A4E-6B4F-9FED-EF75B73AD044}" type="datetimeFigureOut">
               <a:rPr lang="en-US" smtClean="0"/>
-              <a:t>4/20/2024</a:t>
+              <a:t>4/27/2024</a:t>
             </a:fld>
             <a:endParaRPr lang="en-US"/>
           </a:p>
@@ -6371,7 +6379,7 @@
           <a:p>
             <a:fld id="{D088F999-7A4E-6B4F-9FED-EF75B73AD044}" type="datetimeFigureOut">
               <a:rPr lang="en-US" smtClean="0"/>
-              <a:t>4/20/2024</a:t>
+              <a:t>4/27/2024</a:t>
             </a:fld>
             <a:endParaRPr lang="en-US"/>
           </a:p>
@@ -6656,7 +6664,7 @@
           <a:p>
             <a:fld id="{D088F999-7A4E-6B4F-9FED-EF75B73AD044}" type="datetimeFigureOut">
               <a:rPr lang="en-US" smtClean="0"/>
-              <a:t>4/20/2024</a:t>
+              <a:t>4/27/2024</a:t>
             </a:fld>
             <a:endParaRPr lang="en-US"/>
           </a:p>
@@ -7075,7 +7083,7 @@
           <a:p>
             <a:fld id="{D088F999-7A4E-6B4F-9FED-EF75B73AD044}" type="datetimeFigureOut">
               <a:rPr lang="en-US" smtClean="0"/>
-              <a:t>4/20/2024</a:t>
+              <a:t>4/27/2024</a:t>
             </a:fld>
             <a:endParaRPr lang="en-US"/>
           </a:p>
@@ -7192,7 +7200,7 @@
           <a:p>
             <a:fld id="{D088F999-7A4E-6B4F-9FED-EF75B73AD044}" type="datetimeFigureOut">
               <a:rPr lang="en-US" smtClean="0"/>
-              <a:t>4/20/2024</a:t>
+              <a:t>4/27/2024</a:t>
             </a:fld>
             <a:endParaRPr lang="en-US"/>
           </a:p>
@@ -7287,7 +7295,7 @@
           <a:p>
             <a:fld id="{D088F999-7A4E-6B4F-9FED-EF75B73AD044}" type="datetimeFigureOut">
               <a:rPr lang="en-US" smtClean="0"/>
-              <a:t>4/20/2024</a:t>
+              <a:t>4/27/2024</a:t>
             </a:fld>
             <a:endParaRPr lang="en-US"/>
           </a:p>
@@ -7562,7 +7570,7 @@
           <a:p>
             <a:fld id="{D088F999-7A4E-6B4F-9FED-EF75B73AD044}" type="datetimeFigureOut">
               <a:rPr lang="en-US" smtClean="0"/>
-              <a:t>4/20/2024</a:t>
+              <a:t>4/27/2024</a:t>
             </a:fld>
             <a:endParaRPr lang="en-US"/>
           </a:p>
@@ -7814,7 +7822,7 @@
           <a:p>
             <a:fld id="{D088F999-7A4E-6B4F-9FED-EF75B73AD044}" type="datetimeFigureOut">
               <a:rPr lang="en-US" smtClean="0"/>
-              <a:t>4/20/2024</a:t>
+              <a:t>4/27/2024</a:t>
             </a:fld>
             <a:endParaRPr lang="en-US"/>
           </a:p>
@@ -8034,7 +8042,7 @@
           <a:p>
             <a:fld id="{D088F999-7A4E-6B4F-9FED-EF75B73AD044}" type="datetimeFigureOut">
               <a:rPr lang="en-US" smtClean="0"/>
-              <a:t>4/20/2024</a:t>
+              <a:t>4/27/2024</a:t>
             </a:fld>
             <a:endParaRPr lang="en-US"/>
           </a:p>
@@ -8551,7 +8559,7 @@
           <a:p>
             <a:fld id="{D088F999-7A4E-6B4F-9FED-EF75B73AD044}" type="datetimeFigureOut">
               <a:rPr lang="en-US" smtClean="0"/>
-              <a:t>4/20/2024</a:t>
+              <a:t>4/27/2024</a:t>
             </a:fld>
             <a:endParaRPr lang="en-US"/>
           </a:p>
@@ -12551,7 +12559,7 @@
 </file>
 
 <file path=ppt/slides/slide4.xml><?xml version="1.0" encoding="utf-8"?>
-<p:sld xmlns:a="http://schemas.openxmlformats.org/drawingml/2006/main" xmlns:r="http://schemas.openxmlformats.org/officeDocument/2006/relationships" xmlns:p="http://schemas.openxmlformats.org/presentationml/2006/main">
+<p:sld xmlns:a="http://schemas.openxmlformats.org/drawingml/2006/main" xmlns:r="http://schemas.openxmlformats.org/officeDocument/2006/relationships" xmlns:p="http://schemas.openxmlformats.org/presentationml/2006/main" show="0">
   <p:cSld>
     <p:spTree>
       <p:nvGrpSpPr>

</xml_diff>